<commit_message>
Updated project presentation PPT
</commit_message>
<xml_diff>
--- a/Weather-dashboard.pptx
+++ b/Weather-dashboard.pptx
@@ -4243,7 +4243,8 @@
                     <a:lumMod val="75000"/>
                   </a:schemeClr>
                 </a:solidFill>
-                <a:latin typeface="Arial Black" panose="020B0A04020102020204" pitchFamily="34" charset="0"/>
+                <a:latin typeface="Times New Roman" panose="02020603050405020304" pitchFamily="18" charset="0"/>
+                <a:cs typeface="Times New Roman" panose="02020603050405020304" pitchFamily="18" charset="0"/>
               </a:rPr>
               <a:t>Dynamic Weather Dashboard</a:t>
             </a:r>
@@ -4254,7 +4255,8 @@
                     <a:lumMod val="75000"/>
                   </a:schemeClr>
                 </a:solidFill>
-                <a:latin typeface="Arial Black" panose="020B0A04020102020204" pitchFamily="34" charset="0"/>
+                <a:latin typeface="Times New Roman" panose="02020603050405020304" pitchFamily="18" charset="0"/>
+                <a:cs typeface="Times New Roman" panose="02020603050405020304" pitchFamily="18" charset="0"/>
               </a:rPr>
             </a:br>
             <a:endParaRPr lang="en-US" b="1" dirty="0">
@@ -4263,8 +4265,8 @@
                   <a:lumMod val="75000"/>
                 </a:schemeClr>
               </a:solidFill>
-              <a:latin typeface="Arial Black" panose="020B0A04020102020204" pitchFamily="34" charset="0"/>
-              <a:cs typeface="Arial" panose="020B0604020202020204" pitchFamily="34" charset="0"/>
+              <a:latin typeface="Times New Roman" panose="02020603050405020304" pitchFamily="18" charset="0"/>
+              <a:cs typeface="Times New Roman" panose="02020603050405020304" pitchFamily="18" charset="0"/>
             </a:endParaRPr>
           </a:p>
         </p:txBody>
@@ -4313,7 +4315,7 @@
         <p:spPr>
           <a:xfrm>
             <a:off x="3117529" y="4586365"/>
-            <a:ext cx="7980183" cy="1323439"/>
+            <a:ext cx="7980183" cy="1015663"/>
           </a:xfrm>
           <a:prstGeom prst="rect">
             <a:avLst/>
@@ -4326,65 +4328,66 @@
           </a:bodyPr>
           <a:lstStyle/>
           <a:p>
+            <a:r>
+              <a:rPr lang="en-US" sz="2000" b="1" dirty="0" smtClean="0">
+                <a:solidFill>
+                  <a:schemeClr val="accent1">
+                    <a:lumMod val="75000"/>
+                  </a:schemeClr>
+                </a:solidFill>
+                <a:latin typeface="Times New Roman" panose="02020603050405020304" pitchFamily="18" charset="0"/>
+                <a:cs typeface="Times New Roman" panose="02020603050405020304" pitchFamily="18" charset="0"/>
+              </a:rPr>
+              <a:t>1.Name-SAROJ </a:t>
+            </a:r>
+            <a:r>
+              <a:rPr lang="en-US" sz="2000" b="1" dirty="0" smtClean="0">
+                <a:solidFill>
+                  <a:schemeClr val="accent1">
+                    <a:lumMod val="75000"/>
+                  </a:schemeClr>
+                </a:solidFill>
+                <a:latin typeface="Times New Roman" panose="02020603050405020304" pitchFamily="18" charset="0"/>
+                <a:cs typeface="Times New Roman" panose="02020603050405020304" pitchFamily="18" charset="0"/>
+              </a:rPr>
+              <a:t>OJHA</a:t>
+            </a:r>
+          </a:p>
+          <a:p>
+            <a:r>
+              <a:rPr lang="en-US" sz="2000" b="1" dirty="0" smtClean="0">
+                <a:solidFill>
+                  <a:schemeClr val="accent1">
+                    <a:lumMod val="75000"/>
+                  </a:schemeClr>
+                </a:solidFill>
+                <a:latin typeface="Times New Roman" panose="02020603050405020304" pitchFamily="18" charset="0"/>
+                <a:cs typeface="Times New Roman" panose="02020603050405020304" pitchFamily="18" charset="0"/>
+              </a:rPr>
+              <a:t>2.College Name-EATM COLLAGE</a:t>
+            </a:r>
+          </a:p>
+          <a:p>
+            <a:r>
+              <a:rPr lang="en-US" sz="2000" b="1" dirty="0" smtClean="0">
+                <a:solidFill>
+                  <a:schemeClr val="accent1">
+                    <a:lumMod val="75000"/>
+                  </a:schemeClr>
+                </a:solidFill>
+                <a:latin typeface="Times New Roman" panose="02020603050405020304" pitchFamily="18" charset="0"/>
+                <a:cs typeface="Times New Roman" panose="02020603050405020304" pitchFamily="18" charset="0"/>
+              </a:rPr>
+              <a:t>3.Department-CSE</a:t>
+            </a:r>
             <a:endParaRPr lang="en-US" sz="2000" b="1" dirty="0">
               <a:solidFill>
                 <a:schemeClr val="accent1">
                   <a:lumMod val="75000"/>
                 </a:schemeClr>
               </a:solidFill>
-              <a:latin typeface="Arial" pitchFamily="34" charset="0"/>
-              <a:cs typeface="Arial" pitchFamily="34" charset="0"/>
-            </a:endParaRPr>
-          </a:p>
-          <a:p>
-            <a:r>
-              <a:rPr lang="en-US" sz="2000" b="1" dirty="0" smtClean="0">
-                <a:solidFill>
-                  <a:schemeClr val="accent1">
-                    <a:lumMod val="75000"/>
-                  </a:schemeClr>
-                </a:solidFill>
-                <a:latin typeface="Arial"/>
-                <a:cs typeface="Arial"/>
-              </a:rPr>
-              <a:t>1.Name-SAROJ OJHA</a:t>
-            </a:r>
-          </a:p>
-          <a:p>
-            <a:r>
-              <a:rPr lang="en-US" sz="2000" b="1" dirty="0" smtClean="0">
-                <a:solidFill>
-                  <a:schemeClr val="accent1">
-                    <a:lumMod val="75000"/>
-                  </a:schemeClr>
-                </a:solidFill>
-                <a:latin typeface="Arial"/>
-                <a:cs typeface="Arial"/>
-              </a:rPr>
-              <a:t>2.College Name-EATM COLLAGE</a:t>
-            </a:r>
-          </a:p>
-          <a:p>
-            <a:r>
-              <a:rPr lang="en-US" sz="2000" b="1" dirty="0" smtClean="0">
-                <a:solidFill>
-                  <a:schemeClr val="accent1">
-                    <a:lumMod val="75000"/>
-                  </a:schemeClr>
-                </a:solidFill>
-                <a:latin typeface="Arial"/>
-                <a:cs typeface="Arial"/>
-              </a:rPr>
-              <a:t>3.Department-CSE</a:t>
-            </a:r>
-            <a:endParaRPr lang="en-US" sz="2000" b="1" dirty="0">
-              <a:solidFill>
-                <a:schemeClr val="accent1">
-                  <a:lumMod val="75000"/>
-                </a:schemeClr>
-              </a:solidFill>
-              <a:latin typeface="Arial"/>
-              <a:cs typeface="Arial"/>
+              <a:latin typeface="Times New Roman" panose="02020603050405020304" pitchFamily="18" charset="0"/>
+              <a:cs typeface="Times New Roman" panose="02020603050405020304" pitchFamily="18" charset="0"/>
             </a:endParaRPr>
           </a:p>
         </p:txBody>
@@ -4451,8 +4454,8 @@
                 <a:solidFill>
                   <a:srgbClr val="002060"/>
                 </a:solidFill>
-                <a:latin typeface="Arial" panose="020B0604020202020204" pitchFamily="34" charset="0"/>
-                <a:cs typeface="Arial" panose="020B0604020202020204" pitchFamily="34" charset="0"/>
+                <a:latin typeface="Times New Roman" panose="02020603050405020304" pitchFamily="18" charset="0"/>
+                <a:cs typeface="Times New Roman" panose="02020603050405020304" pitchFamily="18" charset="0"/>
               </a:rPr>
               <a:t>THANK YOU</a:t>
             </a:r>
@@ -4520,8 +4523,8 @@
                 <a:solidFill>
                   <a:srgbClr val="002060"/>
                 </a:solidFill>
-                <a:latin typeface="Arial" panose="020B0604020202020204" pitchFamily="34" charset="0"/>
-                <a:cs typeface="Arial" panose="020B0604020202020204" pitchFamily="34" charset="0"/>
+                <a:latin typeface="Times New Roman" panose="02020603050405020304" pitchFamily="18" charset="0"/>
+                <a:cs typeface="Times New Roman" panose="02020603050405020304" pitchFamily="18" charset="0"/>
               </a:rPr>
               <a:t>OUTLINE</a:t>
             </a:r>
@@ -4561,144 +4564,136 @@
             </a:pPr>
             <a:r>
               <a:rPr lang="en-US" sz="2000" b="1" dirty="0">
-                <a:latin typeface="Arial"/>
+                <a:latin typeface="Times New Roman" panose="02020603050405020304" pitchFamily="18" charset="0"/>
                 <a:ea typeface="+mn-lt"/>
-                <a:cs typeface="Arial"/>
+                <a:cs typeface="Times New Roman" panose="02020603050405020304" pitchFamily="18" charset="0"/>
               </a:rPr>
               <a:t>  </a:t>
             </a:r>
             <a:endParaRPr lang="en-US" dirty="0">
-              <a:latin typeface="Arial"/>
-              <a:cs typeface="Arial"/>
+              <a:latin typeface="Times New Roman" panose="02020603050405020304" pitchFamily="18" charset="0"/>
+              <a:cs typeface="Times New Roman" panose="02020603050405020304" pitchFamily="18" charset="0"/>
             </a:endParaRPr>
           </a:p>
           <a:p>
             <a:pPr marL="305435" indent="-305435"/>
             <a:r>
               <a:rPr lang="en-US" sz="2000" b="1" dirty="0">
-                <a:latin typeface="Arial"/>
+                <a:latin typeface="Times New Roman" panose="02020603050405020304" pitchFamily="18" charset="0"/>
                 <a:ea typeface="+mn-lt"/>
-                <a:cs typeface="Arial"/>
+                <a:cs typeface="Times New Roman" panose="02020603050405020304" pitchFamily="18" charset="0"/>
               </a:rPr>
               <a:t>Problem Statement </a:t>
             </a:r>
             <a:r>
               <a:rPr lang="en-US" sz="2000" dirty="0">
-                <a:latin typeface="Arial"/>
+                <a:latin typeface="Times New Roman" panose="02020603050405020304" pitchFamily="18" charset="0"/>
                 <a:ea typeface="+mn-lt"/>
-                <a:cs typeface="Arial"/>
+                <a:cs typeface="Times New Roman" panose="02020603050405020304" pitchFamily="18" charset="0"/>
               </a:rPr>
               <a:t>(Should not include solution)</a:t>
             </a:r>
             <a:endParaRPr lang="en-US" dirty="0">
-              <a:latin typeface="Arial"/>
-              <a:cs typeface="Arial"/>
+              <a:latin typeface="Times New Roman" panose="02020603050405020304" pitchFamily="18" charset="0"/>
+              <a:cs typeface="Times New Roman" panose="02020603050405020304" pitchFamily="18" charset="0"/>
             </a:endParaRPr>
           </a:p>
           <a:p>
             <a:pPr marL="305435" indent="-305435"/>
             <a:r>
               <a:rPr lang="en-US" sz="2000" b="1" dirty="0">
-                <a:latin typeface="Arial"/>
+                <a:latin typeface="Times New Roman" panose="02020603050405020304" pitchFamily="18" charset="0"/>
                 <a:ea typeface="+mn-lt"/>
-                <a:cs typeface="Calibri"/>
-              </a:rPr>
-              <a:t>System </a:t>
-            </a:r>
+                <a:cs typeface="Times New Roman" panose="02020603050405020304" pitchFamily="18" charset="0"/>
+              </a:rPr>
+              <a:t>System Development Approach </a:t>
+            </a:r>
+            <a:r>
+              <a:rPr lang="en-US" sz="2000" dirty="0">
+                <a:latin typeface="Times New Roman" panose="02020603050405020304" pitchFamily="18" charset="0"/>
+                <a:ea typeface="+mn-lt"/>
+                <a:cs typeface="Times New Roman" panose="02020603050405020304" pitchFamily="18" charset="0"/>
+              </a:rPr>
+              <a:t>(Technology Used) </a:t>
+            </a:r>
+            <a:endParaRPr lang="en-US" dirty="0">
+              <a:latin typeface="Times New Roman" panose="02020603050405020304" pitchFamily="18" charset="0"/>
+              <a:ea typeface="+mn-lt"/>
+              <a:cs typeface="Times New Roman" panose="02020603050405020304" pitchFamily="18" charset="0"/>
+            </a:endParaRPr>
+          </a:p>
+          <a:p>
+            <a:pPr marL="305435" indent="-305435"/>
             <a:r>
               <a:rPr lang="en-US" sz="2000" b="1" dirty="0">
-                <a:latin typeface="Arial"/>
+                <a:latin typeface="Times New Roman" panose="02020603050405020304" pitchFamily="18" charset="0"/>
                 <a:ea typeface="+mn-lt"/>
-                <a:cs typeface="+mn-lt"/>
-              </a:rPr>
-              <a:t>Development Approach </a:t>
-            </a:r>
-            <a:r>
-              <a:rPr lang="en-US" sz="2000" dirty="0">
-                <a:latin typeface="Arial"/>
+                <a:cs typeface="Times New Roman" panose="02020603050405020304" pitchFamily="18" charset="0"/>
+              </a:rPr>
+              <a:t>Algorithm &amp; Deployment (Step by Step  Procedure) </a:t>
+            </a:r>
+            <a:endParaRPr lang="en-US" dirty="0">
+              <a:latin typeface="Times New Roman" panose="02020603050405020304" pitchFamily="18" charset="0"/>
+              <a:cs typeface="Times New Roman" panose="02020603050405020304" pitchFamily="18" charset="0"/>
+            </a:endParaRPr>
+          </a:p>
+          <a:p>
+            <a:pPr marL="305435" indent="-305435"/>
+            <a:r>
+              <a:rPr lang="en-US" sz="2000" b="1" dirty="0">
+                <a:latin typeface="Times New Roman" panose="02020603050405020304" pitchFamily="18" charset="0"/>
                 <a:ea typeface="+mn-lt"/>
-                <a:cs typeface="+mn-lt"/>
-              </a:rPr>
-              <a:t>(Technology Used) </a:t>
+                <a:cs typeface="Times New Roman" panose="02020603050405020304" pitchFamily="18" charset="0"/>
+              </a:rPr>
+              <a:t>Result</a:t>
+            </a:r>
+          </a:p>
+          <a:p>
+            <a:pPr marL="305435" indent="-305435"/>
+            <a:r>
+              <a:rPr lang="en-US" sz="2000" b="1" dirty="0">
+                <a:latin typeface="Times New Roman" panose="02020603050405020304" pitchFamily="18" charset="0"/>
+                <a:ea typeface="+mn-lt"/>
+                <a:cs typeface="Times New Roman" panose="02020603050405020304" pitchFamily="18" charset="0"/>
+              </a:rPr>
+              <a:t>Conclusion</a:t>
             </a:r>
             <a:endParaRPr lang="en-US" dirty="0">
-              <a:latin typeface="Arial"/>
-              <a:ea typeface="+mn-lt"/>
-              <a:cs typeface="+mn-lt"/>
+              <a:latin typeface="Times New Roman" panose="02020603050405020304" pitchFamily="18" charset="0"/>
+              <a:cs typeface="Times New Roman" panose="02020603050405020304" pitchFamily="18" charset="0"/>
             </a:endParaRPr>
           </a:p>
           <a:p>
             <a:pPr marL="305435" indent="-305435"/>
             <a:r>
               <a:rPr lang="en-US" sz="2000" b="1" dirty="0">
-                <a:latin typeface="Arial"/>
+                <a:latin typeface="Times New Roman" panose="02020603050405020304" pitchFamily="18" charset="0"/>
                 <a:ea typeface="+mn-lt"/>
-                <a:cs typeface="+mn-lt"/>
-              </a:rPr>
-              <a:t>Algorithm &amp; Deployment (Step by Step  Procedure) </a:t>
+                <a:cs typeface="Times New Roman" panose="02020603050405020304" pitchFamily="18" charset="0"/>
+              </a:rPr>
+              <a:t>Future Scope(Optional)</a:t>
+            </a:r>
+          </a:p>
+          <a:p>
+            <a:pPr marL="305435" indent="-305435"/>
+            <a:r>
+              <a:rPr lang="en-US" sz="2000" b="1" dirty="0">
+                <a:latin typeface="Times New Roman" panose="02020603050405020304" pitchFamily="18" charset="0"/>
+                <a:ea typeface="+mn-lt"/>
+                <a:cs typeface="Times New Roman" panose="02020603050405020304" pitchFamily="18" charset="0"/>
+              </a:rPr>
+              <a:t>References</a:t>
             </a:r>
             <a:endParaRPr lang="en-US" dirty="0">
-              <a:latin typeface="Arial"/>
-              <a:cs typeface="Calibri"/>
-            </a:endParaRPr>
-          </a:p>
-          <a:p>
-            <a:pPr marL="305435" indent="-305435"/>
-            <a:r>
-              <a:rPr lang="en-US" sz="2000" b="1" dirty="0">
-                <a:latin typeface="Arial"/>
-                <a:ea typeface="+mn-lt"/>
-                <a:cs typeface="Arial"/>
-              </a:rPr>
-              <a:t>Result</a:t>
-            </a:r>
-          </a:p>
-          <a:p>
-            <a:pPr marL="305435" indent="-305435"/>
-            <a:r>
-              <a:rPr lang="en-US" sz="2000" b="1" dirty="0">
-                <a:latin typeface="Arial"/>
-                <a:ea typeface="+mn-lt"/>
-                <a:cs typeface="Arial"/>
-              </a:rPr>
-              <a:t>Conclusion</a:t>
-            </a:r>
-            <a:endParaRPr lang="en-US" dirty="0">
-              <a:latin typeface="Arial"/>
-              <a:cs typeface="Arial"/>
-            </a:endParaRPr>
-          </a:p>
-          <a:p>
-            <a:pPr marL="305435" indent="-305435"/>
-            <a:r>
-              <a:rPr lang="en-US" sz="2000" b="1" dirty="0">
-                <a:latin typeface="Arial"/>
-                <a:ea typeface="+mn-lt"/>
-                <a:cs typeface="Arial"/>
-              </a:rPr>
-              <a:t>Future Scope(Optional)</a:t>
-            </a:r>
-          </a:p>
-          <a:p>
-            <a:pPr marL="305435" indent="-305435"/>
-            <a:r>
-              <a:rPr lang="en-US" sz="2000" b="1" dirty="0">
-                <a:latin typeface="Arial"/>
-                <a:ea typeface="+mn-lt"/>
-                <a:cs typeface="Arial"/>
-              </a:rPr>
-              <a:t>References</a:t>
-            </a:r>
-            <a:endParaRPr lang="en-US" dirty="0">
-              <a:latin typeface="Arial"/>
-              <a:cs typeface="Arial"/>
+              <a:latin typeface="Times New Roman" panose="02020603050405020304" pitchFamily="18" charset="0"/>
+              <a:cs typeface="Times New Roman" panose="02020603050405020304" pitchFamily="18" charset="0"/>
             </a:endParaRPr>
           </a:p>
           <a:p>
             <a:pPr marL="305435" indent="-305435"/>
             <a:endParaRPr lang="en-US" dirty="0">
-              <a:latin typeface="Arial"/>
-              <a:cs typeface="Arial"/>
+              <a:latin typeface="Times New Roman" panose="02020603050405020304" pitchFamily="18" charset="0"/>
+              <a:cs typeface="Times New Roman" panose="02020603050405020304" pitchFamily="18" charset="0"/>
             </a:endParaRPr>
           </a:p>
         </p:txBody>
@@ -4761,12 +4756,15 @@
                 <a:solidFill>
                   <a:schemeClr val="accent1"/>
                 </a:solidFill>
-                <a:latin typeface="Arial" panose="020B0604020202020204" pitchFamily="34" charset="0"/>
-                <a:cs typeface="Arial" panose="020B0604020202020204" pitchFamily="34" charset="0"/>
+                <a:latin typeface="Times New Roman" panose="02020603050405020304" pitchFamily="18" charset="0"/>
+                <a:cs typeface="Times New Roman" panose="02020603050405020304" pitchFamily="18" charset="0"/>
               </a:rPr>
               <a:t>Problem Statement</a:t>
             </a:r>
-            <a:endParaRPr lang="en-US" sz="4400"/>
+            <a:endParaRPr lang="en-US" sz="4400">
+              <a:latin typeface="Times New Roman" panose="02020603050405020304" pitchFamily="18" charset="0"/>
+              <a:cs typeface="Times New Roman" panose="02020603050405020304" pitchFamily="18" charset="0"/>
+            </a:endParaRPr>
           </a:p>
         </p:txBody>
       </p:sp>
@@ -4838,25 +4836,37 @@
           <a:lstStyle/>
           <a:p>
             <a:r>
-              <a:rPr lang="en-US" sz="1800" dirty="0"/>
+              <a:rPr lang="en-US" sz="1800" dirty="0">
+                <a:latin typeface="Times New Roman" panose="02020603050405020304" pitchFamily="18" charset="0"/>
+                <a:cs typeface="Times New Roman" panose="02020603050405020304" pitchFamily="18" charset="0"/>
+              </a:rPr>
               <a:t>- People need quick access to real-time weather updates.</a:t>
             </a:r>
           </a:p>
           <a:p>
             <a:r>
-              <a:rPr lang="en-US" sz="1800" dirty="0"/>
+              <a:rPr lang="en-US" sz="1800" dirty="0">
+                <a:latin typeface="Times New Roman" panose="02020603050405020304" pitchFamily="18" charset="0"/>
+                <a:cs typeface="Times New Roman" panose="02020603050405020304" pitchFamily="18" charset="0"/>
+              </a:rPr>
               <a:t>- Existing apps are often complex or overloaded with ads.</a:t>
             </a:r>
           </a:p>
           <a:p>
             <a:r>
-              <a:rPr lang="en-US" sz="1800" dirty="0"/>
+              <a:rPr lang="en-US" sz="1800" dirty="0">
+                <a:latin typeface="Times New Roman" panose="02020603050405020304" pitchFamily="18" charset="0"/>
+                <a:cs typeface="Times New Roman" panose="02020603050405020304" pitchFamily="18" charset="0"/>
+              </a:rPr>
               <a:t>- Travelers and commuters require location-based forecasts for planning.</a:t>
             </a:r>
           </a:p>
           <a:p>
             <a:r>
-              <a:rPr lang="en-US" sz="1800" dirty="0"/>
+              <a:rPr lang="en-US" sz="1800" dirty="0">
+                <a:latin typeface="Times New Roman" panose="02020603050405020304" pitchFamily="18" charset="0"/>
+                <a:cs typeface="Times New Roman" panose="02020603050405020304" pitchFamily="18" charset="0"/>
+              </a:rPr>
               <a:t>- A lightweight, web-based solution is needed to provide current, hourly, and daily forecasts.</a:t>
             </a:r>
           </a:p>
@@ -4925,9 +4935,9 @@
                 <a:solidFill>
                   <a:schemeClr val="accent1"/>
                 </a:solidFill>
-                <a:latin typeface="Arial"/>
+                <a:latin typeface="Times New Roman" panose="02020603050405020304" pitchFamily="18" charset="0"/>
                 <a:ea typeface="+mj-lt"/>
-                <a:cs typeface="Arial"/>
+                <a:cs typeface="Times New Roman" panose="02020603050405020304" pitchFamily="18" charset="0"/>
               </a:rPr>
               <a:t>System  Approach</a:t>
             </a:r>
@@ -4935,8 +4945,8 @@
               <a:solidFill>
                 <a:schemeClr val="accent1"/>
               </a:solidFill>
-              <a:latin typeface="Calibri Light"/>
-              <a:cs typeface="Calibri Light"/>
+              <a:latin typeface="Times New Roman" panose="02020603050405020304" pitchFamily="18" charset="0"/>
+              <a:cs typeface="Times New Roman" panose="02020603050405020304" pitchFamily="18" charset="0"/>
             </a:endParaRPr>
           </a:p>
         </p:txBody>
@@ -5009,67 +5019,103 @@
           <a:lstStyle/>
           <a:p>
             <a:r>
-              <a:rPr lang="en-IN" sz="1800" dirty="0"/>
+              <a:rPr lang="en-IN" sz="1800" dirty="0">
+                <a:latin typeface="Times New Roman" panose="02020603050405020304" pitchFamily="18" charset="0"/>
+                <a:cs typeface="Times New Roman" panose="02020603050405020304" pitchFamily="18" charset="0"/>
+              </a:rPr>
               <a:t>Frontend Technologies:</a:t>
             </a:r>
           </a:p>
           <a:p>
             <a:r>
-              <a:rPr lang="en-IN" sz="1800" dirty="0"/>
+              <a:rPr lang="en-IN" sz="1800" dirty="0">
+                <a:latin typeface="Times New Roman" panose="02020603050405020304" pitchFamily="18" charset="0"/>
+                <a:cs typeface="Times New Roman" panose="02020603050405020304" pitchFamily="18" charset="0"/>
+              </a:rPr>
               <a:t>- HTML5 – Structure of the dashboard</a:t>
             </a:r>
           </a:p>
           <a:p>
             <a:r>
-              <a:rPr lang="en-IN" sz="1800" dirty="0"/>
+              <a:rPr lang="en-IN" sz="1800" dirty="0">
+                <a:latin typeface="Times New Roman" panose="02020603050405020304" pitchFamily="18" charset="0"/>
+                <a:cs typeface="Times New Roman" panose="02020603050405020304" pitchFamily="18" charset="0"/>
+              </a:rPr>
               <a:t>- CSS3 – Styling &amp; glassmorphism design</a:t>
             </a:r>
           </a:p>
           <a:p>
             <a:r>
-              <a:rPr lang="en-IN" sz="1800" dirty="0"/>
+              <a:rPr lang="en-IN" sz="1800" dirty="0">
+                <a:latin typeface="Times New Roman" panose="02020603050405020304" pitchFamily="18" charset="0"/>
+                <a:cs typeface="Times New Roman" panose="02020603050405020304" pitchFamily="18" charset="0"/>
+              </a:rPr>
               <a:t>- JavaScript – Fetching API data, updating UI</a:t>
             </a:r>
           </a:p>
           <a:p>
-            <a:endParaRPr lang="en-IN" sz="1800" dirty="0"/>
-          </a:p>
-          <a:p>
-            <a:r>
-              <a:rPr lang="en-IN" sz="1800" dirty="0"/>
+            <a:endParaRPr lang="en-IN" sz="1800" dirty="0">
+              <a:latin typeface="Times New Roman" panose="02020603050405020304" pitchFamily="18" charset="0"/>
+              <a:cs typeface="Times New Roman" panose="02020603050405020304" pitchFamily="18" charset="0"/>
+            </a:endParaRPr>
+          </a:p>
+          <a:p>
+            <a:r>
+              <a:rPr lang="en-IN" sz="1800" dirty="0">
+                <a:latin typeface="Times New Roman" panose="02020603050405020304" pitchFamily="18" charset="0"/>
+                <a:cs typeface="Times New Roman" panose="02020603050405020304" pitchFamily="18" charset="0"/>
+              </a:rPr>
               <a:t>APIs Used:</a:t>
             </a:r>
           </a:p>
           <a:p>
             <a:r>
-              <a:rPr lang="en-IN" sz="1800" dirty="0"/>
+              <a:rPr lang="en-IN" sz="1800" dirty="0">
+                <a:latin typeface="Times New Roman" panose="02020603050405020304" pitchFamily="18" charset="0"/>
+                <a:cs typeface="Times New Roman" panose="02020603050405020304" pitchFamily="18" charset="0"/>
+              </a:rPr>
               <a:t>- OpenWeatherMap API → Weather data</a:t>
             </a:r>
           </a:p>
           <a:p>
             <a:r>
-              <a:rPr lang="en-IN" sz="1800" dirty="0"/>
+              <a:rPr lang="en-IN" sz="1800" dirty="0">
+                <a:latin typeface="Times New Roman" panose="02020603050405020304" pitchFamily="18" charset="0"/>
+                <a:cs typeface="Times New Roman" panose="02020603050405020304" pitchFamily="18" charset="0"/>
+              </a:rPr>
               <a:t>- Geolocation API → User location</a:t>
             </a:r>
           </a:p>
           <a:p>
-            <a:endParaRPr lang="en-IN" sz="1800" dirty="0"/>
-          </a:p>
-          <a:p>
-            <a:r>
-              <a:rPr lang="en-IN" sz="1800" dirty="0"/>
+            <a:endParaRPr lang="en-IN" sz="1800" dirty="0">
+              <a:latin typeface="Times New Roman" panose="02020603050405020304" pitchFamily="18" charset="0"/>
+              <a:cs typeface="Times New Roman" panose="02020603050405020304" pitchFamily="18" charset="0"/>
+            </a:endParaRPr>
+          </a:p>
+          <a:p>
+            <a:r>
+              <a:rPr lang="en-IN" sz="1800" dirty="0">
+                <a:latin typeface="Times New Roman" panose="02020603050405020304" pitchFamily="18" charset="0"/>
+                <a:cs typeface="Times New Roman" panose="02020603050405020304" pitchFamily="18" charset="0"/>
+              </a:rPr>
               <a:t>Design Approach:</a:t>
             </a:r>
           </a:p>
           <a:p>
             <a:r>
-              <a:rPr lang="en-IN" sz="1800" dirty="0"/>
+              <a:rPr lang="en-IN" sz="1800" dirty="0">
+                <a:latin typeface="Times New Roman" panose="02020603050405020304" pitchFamily="18" charset="0"/>
+                <a:cs typeface="Times New Roman" panose="02020603050405020304" pitchFamily="18" charset="0"/>
+              </a:rPr>
               <a:t>- Clean, modern, glass-style UI</a:t>
             </a:r>
           </a:p>
           <a:p>
             <a:r>
-              <a:rPr lang="en-IN" sz="1800" dirty="0"/>
+              <a:rPr lang="en-IN" sz="1800" dirty="0">
+                <a:latin typeface="Times New Roman" panose="02020603050405020304" pitchFamily="18" charset="0"/>
+                <a:cs typeface="Times New Roman" panose="02020603050405020304" pitchFamily="18" charset="0"/>
+              </a:rPr>
               <a:t>- Mobile responsive layout</a:t>
             </a:r>
           </a:p>
@@ -5133,13 +5179,16 @@
                 <a:solidFill>
                   <a:schemeClr val="accent1"/>
                 </a:solidFill>
-                <a:latin typeface="Arial"/>
+                <a:latin typeface="Times New Roman" panose="02020603050405020304" pitchFamily="18" charset="0"/>
                 <a:ea typeface="+mj-lt"/>
-                <a:cs typeface="Arial"/>
+                <a:cs typeface="Times New Roman" panose="02020603050405020304" pitchFamily="18" charset="0"/>
               </a:rPr>
               <a:t>Algorithm &amp; Deployment</a:t>
             </a:r>
-            <a:endParaRPr lang="en-US"/>
+            <a:endParaRPr lang="en-US">
+              <a:latin typeface="Times New Roman" panose="02020603050405020304" pitchFamily="18" charset="0"/>
+              <a:cs typeface="Times New Roman" panose="02020603050405020304" pitchFamily="18" charset="0"/>
+            </a:endParaRPr>
           </a:p>
         </p:txBody>
       </p:sp>
@@ -5161,8 +5210,8 @@
         </p:nvSpPr>
         <p:spPr bwMode="auto">
           <a:xfrm>
-            <a:off x="581192" y="1266500"/>
-            <a:ext cx="6872331" cy="4744376"/>
+            <a:off x="581192" y="1265987"/>
+            <a:ext cx="6561861" cy="4745402"/>
           </a:xfrm>
           <a:prstGeom prst="rect">
             <a:avLst/>
@@ -5211,64 +5260,97 @@
           <a:lstStyle/>
           <a:p>
             <a:r>
-              <a:rPr lang="en-IN" sz="1800" dirty="0"/>
+              <a:rPr lang="en-IN" sz="1800" dirty="0">
+                <a:latin typeface="Times New Roman" panose="02020603050405020304" pitchFamily="18" charset="0"/>
+                <a:cs typeface="Times New Roman" panose="02020603050405020304" pitchFamily="18" charset="0"/>
+              </a:rPr>
               <a:t>Algorithm:</a:t>
             </a:r>
           </a:p>
           <a:p>
             <a:r>
-              <a:rPr lang="en-IN" sz="1800" dirty="0"/>
+              <a:rPr lang="en-IN" sz="1800" dirty="0">
+                <a:latin typeface="Times New Roman" panose="02020603050405020304" pitchFamily="18" charset="0"/>
+                <a:cs typeface="Times New Roman" panose="02020603050405020304" pitchFamily="18" charset="0"/>
+              </a:rPr>
               <a:t>1. Request user location with Geolocation API</a:t>
             </a:r>
           </a:p>
           <a:p>
             <a:r>
-              <a:rPr lang="en-IN" sz="1800" dirty="0"/>
+              <a:rPr lang="en-IN" sz="1800" dirty="0">
+                <a:latin typeface="Times New Roman" panose="02020603050405020304" pitchFamily="18" charset="0"/>
+                <a:cs typeface="Times New Roman" panose="02020603050405020304" pitchFamily="18" charset="0"/>
+              </a:rPr>
               <a:t>2. Fetch weather data (current + forecast) from OpenWeatherMap</a:t>
             </a:r>
           </a:p>
           <a:p>
             <a:r>
-              <a:rPr lang="en-IN" sz="1800" dirty="0"/>
+              <a:rPr lang="en-IN" sz="1800" dirty="0">
+                <a:latin typeface="Times New Roman" panose="02020603050405020304" pitchFamily="18" charset="0"/>
+                <a:cs typeface="Times New Roman" panose="02020603050405020304" pitchFamily="18" charset="0"/>
+              </a:rPr>
               <a:t>3. Parse JSON response</a:t>
             </a:r>
           </a:p>
           <a:p>
             <a:r>
-              <a:rPr lang="en-IN" sz="1800" dirty="0"/>
+              <a:rPr lang="en-IN" sz="1800" dirty="0">
+                <a:latin typeface="Times New Roman" panose="02020603050405020304" pitchFamily="18" charset="0"/>
+                <a:cs typeface="Times New Roman" panose="02020603050405020304" pitchFamily="18" charset="0"/>
+              </a:rPr>
               <a:t>4. Display current temperature, humidity, wind speed, and icon</a:t>
             </a:r>
           </a:p>
           <a:p>
             <a:r>
-              <a:rPr lang="en-IN" sz="1800" dirty="0"/>
+              <a:rPr lang="en-IN" sz="1800" dirty="0">
+                <a:latin typeface="Times New Roman" panose="02020603050405020304" pitchFamily="18" charset="0"/>
+                <a:cs typeface="Times New Roman" panose="02020603050405020304" pitchFamily="18" charset="0"/>
+              </a:rPr>
               <a:t>5. Render hourly and daily forecasts</a:t>
             </a:r>
           </a:p>
           <a:p>
             <a:r>
-              <a:rPr lang="en-IN" sz="1800" dirty="0"/>
+              <a:rPr lang="en-IN" sz="1800" dirty="0">
+                <a:latin typeface="Times New Roman" panose="02020603050405020304" pitchFamily="18" charset="0"/>
+                <a:cs typeface="Times New Roman" panose="02020603050405020304" pitchFamily="18" charset="0"/>
+              </a:rPr>
               <a:t>6. Toggle temperature units (°C / °F)</a:t>
             </a:r>
           </a:p>
           <a:p>
-            <a:endParaRPr lang="en-IN" sz="1800" dirty="0"/>
-          </a:p>
-          <a:p>
-            <a:r>
-              <a:rPr lang="en-IN" sz="1800" dirty="0"/>
+            <a:endParaRPr lang="en-IN" sz="1800" dirty="0">
+              <a:latin typeface="Times New Roman" panose="02020603050405020304" pitchFamily="18" charset="0"/>
+              <a:cs typeface="Times New Roman" panose="02020603050405020304" pitchFamily="18" charset="0"/>
+            </a:endParaRPr>
+          </a:p>
+          <a:p>
+            <a:r>
+              <a:rPr lang="en-IN" sz="1800" dirty="0">
+                <a:latin typeface="Times New Roman" panose="02020603050405020304" pitchFamily="18" charset="0"/>
+                <a:cs typeface="Times New Roman" panose="02020603050405020304" pitchFamily="18" charset="0"/>
+              </a:rPr>
               <a:t>Deployment:</a:t>
             </a:r>
           </a:p>
           <a:p>
             <a:r>
-              <a:rPr lang="en-IN" sz="1800" dirty="0"/>
+              <a:rPr lang="en-IN" sz="1800" dirty="0">
+                <a:latin typeface="Times New Roman" panose="02020603050405020304" pitchFamily="18" charset="0"/>
+                <a:cs typeface="Times New Roman" panose="02020603050405020304" pitchFamily="18" charset="0"/>
+              </a:rPr>
               <a:t>- Local testing with Live Server</a:t>
             </a:r>
           </a:p>
           <a:p>
             <a:r>
-              <a:rPr lang="en-IN" sz="1800" dirty="0"/>
+              <a:rPr lang="en-IN" sz="1800" dirty="0">
+                <a:latin typeface="Times New Roman" panose="02020603050405020304" pitchFamily="18" charset="0"/>
+                <a:cs typeface="Times New Roman" panose="02020603050405020304" pitchFamily="18" charset="0"/>
+              </a:rPr>
               <a:t>- Hosting via GitHub Pages / Netlify</a:t>
             </a:r>
           </a:p>
@@ -5320,7 +5402,12 @@
             <p:ph type="title"/>
           </p:nvPr>
         </p:nvSpPr>
-        <p:spPr/>
+        <p:spPr>
+          <a:xfrm>
+            <a:off x="431903" y="560031"/>
+            <a:ext cx="11029616" cy="530296"/>
+          </a:xfrm>
+        </p:spPr>
         <p:txBody>
           <a:bodyPr>
             <a:normAutofit fontScale="90000"/>
@@ -5328,17 +5415,20 @@
           <a:lstStyle/>
           <a:p>
             <a:r>
-              <a:rPr lang="en-US" sz="4400" b="1">
+              <a:rPr lang="en-US" sz="4400" b="1" dirty="0">
                 <a:solidFill>
                   <a:schemeClr val="accent1"/>
                 </a:solidFill>
-                <a:latin typeface="Arial"/>
+                <a:latin typeface="Times New Roman" panose="02020603050405020304" pitchFamily="18" charset="0"/>
                 <a:ea typeface="+mj-lt"/>
-                <a:cs typeface="Arial"/>
+                <a:cs typeface="Times New Roman" panose="02020603050405020304" pitchFamily="18" charset="0"/>
               </a:rPr>
               <a:t>Result</a:t>
             </a:r>
-            <a:endParaRPr lang="en-US"/>
+            <a:endParaRPr lang="en-US" dirty="0">
+              <a:latin typeface="Times New Roman" panose="02020603050405020304" pitchFamily="18" charset="0"/>
+              <a:cs typeface="Times New Roman" panose="02020603050405020304" pitchFamily="18" charset="0"/>
+            </a:endParaRPr>
           </a:p>
         </p:txBody>
       </p:sp>
@@ -5358,7 +5448,12 @@
             <p:ph idx="1"/>
           </p:nvPr>
         </p:nvSpPr>
-        <p:spPr/>
+        <p:spPr>
+          <a:xfrm>
+            <a:off x="581192" y="3769567"/>
+            <a:ext cx="11029615" cy="2205783"/>
+          </a:xfrm>
+        </p:spPr>
         <p:txBody>
           <a:bodyPr>
             <a:normAutofit/>
@@ -5368,41 +5463,92 @@
             <a:pPr marL="0" indent="0">
               <a:buNone/>
             </a:pPr>
-            <a:endParaRPr lang="en-US" dirty="0"/>
-          </a:p>
-          <a:p>
-            <a:pPr marL="305435" indent="-305435"/>
-            <a:endParaRPr lang="en-US" sz="2800" b="1" dirty="0"/>
-          </a:p>
-          <a:p>
-            <a:pPr marL="305435" indent="-305435"/>
-            <a:endParaRPr lang="en-US" sz="2800" b="1" dirty="0" smtClean="0"/>
-          </a:p>
-          <a:p>
-            <a:pPr marL="305435" indent="-305435"/>
-            <a:endParaRPr lang="en-US" sz="2800" b="1" dirty="0"/>
-          </a:p>
-          <a:p>
-            <a:pPr marL="305435" indent="-305435"/>
-            <a:r>
-              <a:rPr lang="en-US" sz="2800" b="1" dirty="0" smtClean="0"/>
-              <a:t>Attach </a:t>
-            </a:r>
-            <a:r>
-              <a:rPr lang="en-US" sz="2800" b="1" dirty="0"/>
-              <a:t>your Github link</a:t>
-            </a:r>
-          </a:p>
-          <a:p>
-            <a:pPr marL="305435" indent="-305435"/>
-            <a:r>
-              <a:rPr lang="en-US" sz="2800" dirty="0">
-                <a:ea typeface="+mn-lt"/>
-                <a:cs typeface="+mn-lt"/>
-              </a:rPr>
-              <a:t>https://github.com/</a:t>
-            </a:r>
-            <a:endParaRPr lang="en-US" sz="2800" b="1" dirty="0"/>
+            <a:r>
+              <a:rPr lang="en-US" sz="2800" dirty="0" smtClean="0">
+                <a:latin typeface="Times New Roman" panose="02020603050405020304" pitchFamily="18" charset="0"/>
+                <a:cs typeface="Times New Roman" panose="02020603050405020304" pitchFamily="18" charset="0"/>
+              </a:rPr>
+              <a:t>Github link</a:t>
+            </a:r>
+          </a:p>
+          <a:p>
+            <a:pPr marL="0" indent="0">
+              <a:buNone/>
+            </a:pPr>
+            <a:r>
+              <a:rPr lang="en-US" sz="1600" dirty="0">
+                <a:latin typeface="Times New Roman" panose="02020603050405020304" pitchFamily="18" charset="0"/>
+                <a:cs typeface="Times New Roman" panose="02020603050405020304" pitchFamily="18" charset="0"/>
+                <a:hlinkClick r:id="rId2"/>
+              </a:rPr>
+              <a:t>https://</a:t>
+            </a:r>
+            <a:r>
+              <a:rPr lang="en-US" sz="1600" dirty="0" smtClean="0">
+                <a:latin typeface="Times New Roman" panose="02020603050405020304" pitchFamily="18" charset="0"/>
+                <a:cs typeface="Times New Roman" panose="02020603050405020304" pitchFamily="18" charset="0"/>
+                <a:hlinkClick r:id="rId2"/>
+              </a:rPr>
+              <a:t>github.com/Mr-Saroj/Weather-dashboard/settings</a:t>
+            </a:r>
+            <a:r>
+              <a:rPr lang="en-US" sz="1600" dirty="0" smtClean="0">
+                <a:latin typeface="Times New Roman" panose="02020603050405020304" pitchFamily="18" charset="0"/>
+                <a:cs typeface="Times New Roman" panose="02020603050405020304" pitchFamily="18" charset="0"/>
+              </a:rPr>
+              <a:t> </a:t>
+            </a:r>
+          </a:p>
+          <a:p>
+            <a:pPr marL="0" indent="0">
+              <a:buNone/>
+            </a:pPr>
+            <a:r>
+              <a:rPr lang="en-US" sz="2800" smtClean="0">
+                <a:latin typeface="Times New Roman" panose="02020603050405020304" pitchFamily="18" charset="0"/>
+                <a:cs typeface="Times New Roman" panose="02020603050405020304" pitchFamily="18" charset="0"/>
+              </a:rPr>
+              <a:t>Deployment </a:t>
+            </a:r>
+            <a:r>
+              <a:rPr lang="en-US" sz="2800" dirty="0" smtClean="0">
+                <a:latin typeface="Times New Roman" panose="02020603050405020304" pitchFamily="18" charset="0"/>
+                <a:cs typeface="Times New Roman" panose="02020603050405020304" pitchFamily="18" charset="0"/>
+              </a:rPr>
+              <a:t>link</a:t>
+            </a:r>
+          </a:p>
+          <a:p>
+            <a:pPr marL="0" indent="0">
+              <a:buNone/>
+            </a:pPr>
+            <a:r>
+              <a:rPr lang="en-US" sz="1600" dirty="0">
+                <a:latin typeface="Times New Roman" panose="02020603050405020304" pitchFamily="18" charset="0"/>
+                <a:cs typeface="Times New Roman" panose="02020603050405020304" pitchFamily="18" charset="0"/>
+                <a:hlinkClick r:id="rId3"/>
+              </a:rPr>
+              <a:t>https://mr-saroj.github.io/Weather-dashboard</a:t>
+            </a:r>
+            <a:r>
+              <a:rPr lang="en-US" sz="1600" dirty="0" smtClean="0">
+                <a:latin typeface="Times New Roman" panose="02020603050405020304" pitchFamily="18" charset="0"/>
+                <a:cs typeface="Times New Roman" panose="02020603050405020304" pitchFamily="18" charset="0"/>
+                <a:hlinkClick r:id="rId3"/>
+              </a:rPr>
+              <a:t>/</a:t>
+            </a:r>
+            <a:r>
+              <a:rPr lang="en-US" sz="1600" dirty="0" smtClean="0">
+                <a:latin typeface="Times New Roman" panose="02020603050405020304" pitchFamily="18" charset="0"/>
+                <a:cs typeface="Times New Roman" panose="02020603050405020304" pitchFamily="18" charset="0"/>
+              </a:rPr>
+              <a:t> </a:t>
+            </a:r>
+            <a:endParaRPr lang="en-US" sz="1600" dirty="0">
+              <a:latin typeface="Times New Roman" panose="02020603050405020304" pitchFamily="18" charset="0"/>
+              <a:cs typeface="Times New Roman" panose="02020603050405020304" pitchFamily="18" charset="0"/>
+            </a:endParaRPr>
           </a:p>
         </p:txBody>
       </p:sp>
@@ -5415,14 +5561,14 @@
           <p:nvPr/>
         </p:nvPicPr>
         <p:blipFill>
-          <a:blip r:embed="rId2"/>
+          <a:blip r:embed="rId4"/>
           <a:stretch>
             <a:fillRect/>
           </a:stretch>
         </p:blipFill>
         <p:spPr>
           <a:xfrm>
-            <a:off x="581192" y="1408923"/>
+            <a:off x="506547" y="993866"/>
             <a:ext cx="6239486" cy="2584579"/>
           </a:xfrm>
           <a:prstGeom prst="rect">
@@ -5488,13 +5634,16 @@
                 <a:solidFill>
                   <a:schemeClr val="accent1"/>
                 </a:solidFill>
-                <a:latin typeface="Arial"/>
+                <a:latin typeface="Times New Roman" panose="02020603050405020304" pitchFamily="18" charset="0"/>
                 <a:ea typeface="+mj-lt"/>
-                <a:cs typeface="Arial"/>
+                <a:cs typeface="Times New Roman" panose="02020603050405020304" pitchFamily="18" charset="0"/>
               </a:rPr>
               <a:t>Conclusion</a:t>
             </a:r>
-            <a:endParaRPr lang="en-US"/>
+            <a:endParaRPr lang="en-US">
+              <a:latin typeface="Times New Roman" panose="02020603050405020304" pitchFamily="18" charset="0"/>
+              <a:cs typeface="Times New Roman" panose="02020603050405020304" pitchFamily="18" charset="0"/>
+            </a:endParaRPr>
           </a:p>
         </p:txBody>
       </p:sp>
@@ -5566,25 +5715,37 @@
           <a:lstStyle/>
           <a:p>
             <a:r>
-              <a:rPr lang="en-US" sz="1800" dirty="0"/>
+              <a:rPr lang="en-US" sz="1800" dirty="0">
+                <a:latin typeface="Times New Roman" panose="02020603050405020304" pitchFamily="18" charset="0"/>
+                <a:cs typeface="Times New Roman" panose="02020603050405020304" pitchFamily="18" charset="0"/>
+              </a:rPr>
               <a:t>- Provides a fast and user-friendly weather dashboard</a:t>
             </a:r>
           </a:p>
           <a:p>
             <a:r>
-              <a:rPr lang="en-US" sz="1800" dirty="0"/>
+              <a:rPr lang="en-US" sz="1800" dirty="0">
+                <a:latin typeface="Times New Roman" panose="02020603050405020304" pitchFamily="18" charset="0"/>
+                <a:cs typeface="Times New Roman" panose="02020603050405020304" pitchFamily="18" charset="0"/>
+              </a:rPr>
               <a:t>- Eliminates the need for heavy apps</a:t>
             </a:r>
           </a:p>
           <a:p>
             <a:r>
-              <a:rPr lang="en-US" sz="1800" dirty="0"/>
+              <a:rPr lang="en-US" sz="1800" dirty="0">
+                <a:latin typeface="Times New Roman" panose="02020603050405020304" pitchFamily="18" charset="0"/>
+                <a:cs typeface="Times New Roman" panose="02020603050405020304" pitchFamily="18" charset="0"/>
+              </a:rPr>
               <a:t>- Assists in daily planning &amp; travel</a:t>
             </a:r>
           </a:p>
           <a:p>
             <a:r>
-              <a:rPr lang="en-US" sz="1800" dirty="0"/>
+              <a:rPr lang="en-US" sz="1800" dirty="0">
+                <a:latin typeface="Times New Roman" panose="02020603050405020304" pitchFamily="18" charset="0"/>
+                <a:cs typeface="Times New Roman" panose="02020603050405020304" pitchFamily="18" charset="0"/>
+              </a:rPr>
               <a:t>- Demonstrates integration of APIs with frontend web technologies</a:t>
             </a:r>
           </a:p>
@@ -5731,8 +5892,8 @@
                 <a:solidFill>
                   <a:schemeClr val="accent1"/>
                 </a:solidFill>
-                <a:latin typeface="Arial"/>
-                <a:cs typeface="Arial"/>
+                <a:latin typeface="Times New Roman" panose="02020603050405020304" pitchFamily="18" charset="0"/>
+                <a:cs typeface="Times New Roman" panose="02020603050405020304" pitchFamily="18" charset="0"/>
               </a:rPr>
               <a:t>Future scope(Optional)</a:t>
             </a:r>
@@ -5757,8 +5918,8 @@
         </p:nvSpPr>
         <p:spPr bwMode="auto">
           <a:xfrm>
-            <a:off x="581192" y="2012089"/>
-            <a:ext cx="6163867" cy="3253198"/>
+            <a:off x="581192" y="2023117"/>
+            <a:ext cx="5638082" cy="3231141"/>
           </a:xfrm>
           <a:prstGeom prst="rect">
             <a:avLst/>
@@ -5807,29 +5968,44 @@
           <a:lstStyle/>
           <a:p>
             <a:r>
-              <a:rPr lang="en-US" sz="1800" dirty="0"/>
+              <a:rPr lang="en-US" sz="1800" dirty="0">
+                <a:latin typeface="Times New Roman" panose="02020603050405020304" pitchFamily="18" charset="0"/>
+                <a:cs typeface="Times New Roman" panose="02020603050405020304" pitchFamily="18" charset="0"/>
+              </a:rPr>
               <a:t>- Add alerts for severe weather conditions</a:t>
             </a:r>
           </a:p>
           <a:p>
             <a:r>
-              <a:rPr lang="en-US" sz="1800" dirty="0"/>
+              <a:rPr lang="en-US" sz="1800" dirty="0">
+                <a:latin typeface="Times New Roman" panose="02020603050405020304" pitchFamily="18" charset="0"/>
+                <a:cs typeface="Times New Roman" panose="02020603050405020304" pitchFamily="18" charset="0"/>
+              </a:rPr>
               <a:t>- Integrate maps for multiple cities</a:t>
             </a:r>
           </a:p>
           <a:p>
             <a:r>
-              <a:rPr lang="en-US" sz="1800" dirty="0"/>
+              <a:rPr lang="en-US" sz="1800" dirty="0">
+                <a:latin typeface="Times New Roman" panose="02020603050405020304" pitchFamily="18" charset="0"/>
+                <a:cs typeface="Times New Roman" panose="02020603050405020304" pitchFamily="18" charset="0"/>
+              </a:rPr>
               <a:t>- Backend (Node.js/DB) for favorite locations</a:t>
             </a:r>
           </a:p>
           <a:p>
             <a:r>
-              <a:rPr lang="en-US" sz="1800" dirty="0"/>
+              <a:rPr lang="en-US" sz="1800" dirty="0">
+                <a:latin typeface="Times New Roman" panose="02020603050405020304" pitchFamily="18" charset="0"/>
+                <a:cs typeface="Times New Roman" panose="02020603050405020304" pitchFamily="18" charset="0"/>
+              </a:rPr>
               <a:t>- Voice assistant integration for </a:t>
             </a:r>
             <a:r>
-              <a:rPr lang="en-US" sz="1800" dirty="0" smtClean="0"/>
+              <a:rPr lang="en-US" sz="1800" dirty="0" smtClean="0">
+                <a:latin typeface="Times New Roman" panose="02020603050405020304" pitchFamily="18" charset="0"/>
+                <a:cs typeface="Times New Roman" panose="02020603050405020304" pitchFamily="18" charset="0"/>
+              </a:rPr>
               <a:t>accessibility</a:t>
             </a:r>
           </a:p>
@@ -5854,7 +6030,8 @@
                 <a:solidFill>
                   <a:schemeClr val="tx1"/>
                 </a:solidFill>
-                <a:latin typeface="Arial" panose="020B0604020202020204" pitchFamily="34" charset="0"/>
+                <a:latin typeface="Times New Roman" panose="02020603050405020304" pitchFamily="18" charset="0"/>
+                <a:cs typeface="Times New Roman" panose="02020603050405020304" pitchFamily="18" charset="0"/>
               </a:rPr>
               <a:t>Add backend integration (Node.js) for order management.</a:t>
             </a:r>
@@ -5880,7 +6057,8 @@
                 <a:solidFill>
                   <a:schemeClr val="tx1"/>
                 </a:solidFill>
-                <a:latin typeface="Arial" panose="020B0604020202020204" pitchFamily="34" charset="0"/>
+                <a:latin typeface="Times New Roman" panose="02020603050405020304" pitchFamily="18" charset="0"/>
+                <a:cs typeface="Times New Roman" panose="02020603050405020304" pitchFamily="18" charset="0"/>
               </a:rPr>
               <a:t>Secure </a:t>
             </a:r>
@@ -5889,7 +6067,8 @@
                 <a:solidFill>
                   <a:schemeClr val="tx1"/>
                 </a:solidFill>
-                <a:latin typeface="Arial" panose="020B0604020202020204" pitchFamily="34" charset="0"/>
+                <a:latin typeface="Times New Roman" panose="02020603050405020304" pitchFamily="18" charset="0"/>
+                <a:cs typeface="Times New Roman" panose="02020603050405020304" pitchFamily="18" charset="0"/>
               </a:rPr>
               <a:t>payment gateway integration</a:t>
             </a:r>
@@ -5898,7 +6077,8 @@
                 <a:solidFill>
                   <a:schemeClr val="tx1"/>
                 </a:solidFill>
-                <a:latin typeface="Arial" panose="020B0604020202020204" pitchFamily="34" charset="0"/>
+                <a:latin typeface="Times New Roman" panose="02020603050405020304" pitchFamily="18" charset="0"/>
+                <a:cs typeface="Times New Roman" panose="02020603050405020304" pitchFamily="18" charset="0"/>
               </a:rPr>
               <a:t>.</a:t>
             </a:r>
@@ -5924,7 +6104,8 @@
                 <a:solidFill>
                   <a:schemeClr val="tx1"/>
                 </a:solidFill>
-                <a:latin typeface="Arial" panose="020B0604020202020204" pitchFamily="34" charset="0"/>
+                <a:latin typeface="Times New Roman" panose="02020603050405020304" pitchFamily="18" charset="0"/>
+                <a:cs typeface="Times New Roman" panose="02020603050405020304" pitchFamily="18" charset="0"/>
               </a:rPr>
               <a:t>Admin dashboard for inventory updates.</a:t>
             </a:r>
@@ -5950,13 +6131,17 @@
                 <a:solidFill>
                   <a:schemeClr val="tx1"/>
                 </a:solidFill>
-                <a:latin typeface="Arial" panose="020B0604020202020204" pitchFamily="34" charset="0"/>
+                <a:latin typeface="Times New Roman" panose="02020603050405020304" pitchFamily="18" charset="0"/>
+                <a:cs typeface="Times New Roman" panose="02020603050405020304" pitchFamily="18" charset="0"/>
               </a:rPr>
               <a:t>AI-based product recommendations.</a:t>
             </a:r>
           </a:p>
           <a:p>
-            <a:endParaRPr lang="en-US" sz="1800" dirty="0"/>
+            <a:endParaRPr lang="en-US" sz="1800" dirty="0">
+              <a:latin typeface="Times New Roman" panose="02020603050405020304" pitchFamily="18" charset="0"/>
+              <a:cs typeface="Times New Roman" panose="02020603050405020304" pitchFamily="18" charset="0"/>
+            </a:endParaRPr>
           </a:p>
         </p:txBody>
       </p:sp>
@@ -6018,13 +6203,16 @@
                 <a:solidFill>
                   <a:schemeClr val="accent1"/>
                 </a:solidFill>
-                <a:latin typeface="Arial"/>
+                <a:latin typeface="Times New Roman" panose="02020603050405020304" pitchFamily="18" charset="0"/>
                 <a:ea typeface="+mj-lt"/>
-                <a:cs typeface="Arial"/>
+                <a:cs typeface="Times New Roman" panose="02020603050405020304" pitchFamily="18" charset="0"/>
               </a:rPr>
               <a:t>References</a:t>
             </a:r>
-            <a:endParaRPr lang="en-US"/>
+            <a:endParaRPr lang="en-US">
+              <a:latin typeface="Times New Roman" panose="02020603050405020304" pitchFamily="18" charset="0"/>
+              <a:cs typeface="Times New Roman" panose="02020603050405020304" pitchFamily="18" charset="0"/>
+            </a:endParaRPr>
           </a:p>
         </p:txBody>
       </p:sp>
@@ -6052,25 +6240,37 @@
           <a:lstStyle/>
           <a:p>
             <a:r>
-              <a:rPr lang="en-IN" sz="2800" dirty="0"/>
+              <a:rPr lang="en-IN" sz="2800" dirty="0">
+                <a:latin typeface="Times New Roman" panose="02020603050405020304" pitchFamily="18" charset="0"/>
+                <a:cs typeface="Times New Roman" panose="02020603050405020304" pitchFamily="18" charset="0"/>
+              </a:rPr>
               <a:t>- OpenWeatherMap API Docs (https://openweathermap.org/api)</a:t>
             </a:r>
           </a:p>
           <a:p>
             <a:r>
-              <a:rPr lang="en-IN" sz="2800" dirty="0"/>
+              <a:rPr lang="en-IN" sz="2800" dirty="0">
+                <a:latin typeface="Times New Roman" panose="02020603050405020304" pitchFamily="18" charset="0"/>
+                <a:cs typeface="Times New Roman" panose="02020603050405020304" pitchFamily="18" charset="0"/>
+              </a:rPr>
               <a:t>- MDN Web Docs – Geolocation API</a:t>
             </a:r>
           </a:p>
           <a:p>
             <a:r>
-              <a:rPr lang="en-IN" sz="2800" dirty="0"/>
+              <a:rPr lang="en-IN" sz="2800" dirty="0">
+                <a:latin typeface="Times New Roman" panose="02020603050405020304" pitchFamily="18" charset="0"/>
+                <a:cs typeface="Times New Roman" panose="02020603050405020304" pitchFamily="18" charset="0"/>
+              </a:rPr>
               <a:t>- Bootstrap v5.3 (if used)</a:t>
             </a:r>
           </a:p>
           <a:p>
             <a:r>
-              <a:rPr lang="en-IN" sz="2800" dirty="0"/>
+              <a:rPr lang="en-IN" sz="2800" dirty="0">
+                <a:latin typeface="Times New Roman" panose="02020603050405020304" pitchFamily="18" charset="0"/>
+                <a:cs typeface="Times New Roman" panose="02020603050405020304" pitchFamily="18" charset="0"/>
+              </a:rPr>
               <a:t>- Your GitHub Repository Link</a:t>
             </a:r>
           </a:p>
@@ -6901,21 +7101,21 @@
 </file>
 
 <file path=customXml/item2.xml><?xml version="1.0" encoding="utf-8"?>
+<p:properties xmlns:p="http://schemas.microsoft.com/office/2006/metadata/properties" xmlns:xsi="http://www.w3.org/2001/XMLSchema-instance" xmlns:pc="http://schemas.microsoft.com/office/infopath/2007/PartnerControls">
+  <documentManagement>
+    <MediaServiceKeyPoints xmlns="9162bd5b-4ed9-4da3-b376-05204580ba3f" xsi:nil="true"/>
+    <_activity xmlns="9162bd5b-4ed9-4da3-b376-05204580ba3f" xsi:nil="true"/>
+  </documentManagement>
+</p:properties>
+</file>
+
+<file path=customXml/item3.xml><?xml version="1.0" encoding="utf-8"?>
 <?mso-contentType ?>
 <FormTemplates xmlns="http://schemas.microsoft.com/sharepoint/v3/contenttype/forms">
   <Display>DocumentLibraryForm</Display>
   <Edit>DocumentLibraryForm</Edit>
   <New>DocumentLibraryForm</New>
 </FormTemplates>
-</file>
-
-<file path=customXml/item3.xml><?xml version="1.0" encoding="utf-8"?>
-<p:properties xmlns:p="http://schemas.microsoft.com/office/2006/metadata/properties" xmlns:xsi="http://www.w3.org/2001/XMLSchema-instance" xmlns:pc="http://schemas.microsoft.com/office/infopath/2007/PartnerControls">
-  <documentManagement>
-    <MediaServiceKeyPoints xmlns="9162bd5b-4ed9-4da3-b376-05204580ba3f" xsi:nil="true"/>
-    <_activity xmlns="9162bd5b-4ed9-4da3-b376-05204580ba3f" xsi:nil="true"/>
-  </documentManagement>
-</p:properties>
 </file>
 
 <file path=customXml/itemProps1.xml><?xml version="1.0" encoding="utf-8"?>
@@ -6938,14 +7138,6 @@
 </file>
 
 <file path=customXml/itemProps2.xml><?xml version="1.0" encoding="utf-8"?>
-<ds:datastoreItem xmlns:ds="http://schemas.openxmlformats.org/officeDocument/2006/customXml" ds:itemID="{927BD4C1-B6B1-4715-ABF9-E660A51A4EA0}">
-  <ds:schemaRefs>
-    <ds:schemaRef ds:uri="http://schemas.microsoft.com/sharepoint/v3/contenttype/forms"/>
-  </ds:schemaRefs>
-</ds:datastoreItem>
-</file>
-
-<file path=customXml/itemProps3.xml><?xml version="1.0" encoding="utf-8"?>
 <ds:datastoreItem xmlns:ds="http://schemas.openxmlformats.org/officeDocument/2006/customXml" ds:itemID="{8D289AE2-D2AE-49D1-AFAC-3A79F6794255}">
   <ds:schemaRefs>
     <ds:schemaRef ds:uri="http://purl.org/dc/terms/"/>
@@ -6960,4 +7152,12 @@
     <ds:schemaRef ds:uri="http://www.w3.org/XML/1998/namespace"/>
   </ds:schemaRefs>
 </ds:datastoreItem>
+</file>
+
+<file path=customXml/itemProps3.xml><?xml version="1.0" encoding="utf-8"?>
+<ds:datastoreItem xmlns:ds="http://schemas.openxmlformats.org/officeDocument/2006/customXml" ds:itemID="{927BD4C1-B6B1-4715-ABF9-E660A51A4EA0}">
+  <ds:schemaRefs>
+    <ds:schemaRef ds:uri="http://schemas.microsoft.com/sharepoint/v3/contenttype/forms"/>
+  </ds:schemaRefs>
+</ds:datastoreItem>
 </file>
</xml_diff>